<commit_message>
Encoder seems working now, lower the sample rate to 200Hz
</commit_message>
<xml_diff>
--- a/Docs/images/MindCube.pptx
+++ b/Docs/images/MindCube.pptx
@@ -6,6 +6,9 @@
   </p:sldMasterIdLst>
   <p:sldIdLst>
     <p:sldId id="256" r:id="rId2"/>
+    <p:sldId id="257" r:id="rId3"/>
+    <p:sldId id="258" r:id="rId4"/>
+    <p:sldId id="259" r:id="rId5"/>
   </p:sldIdLst>
   <p:sldSz cx="12192000" cy="6858000"/>
   <p:notesSz cx="6858000" cy="9144000"/>
@@ -3321,60 +3324,1667 @@
           <a:chExt cx="0" cy="0"/>
         </a:xfrm>
       </p:grpSpPr>
-      <p:sp>
-        <p:nvSpPr>
-          <p:cNvPr id="2" name="Title 1">
-            <a:extLst>
-              <a:ext uri="{FF2B5EF4-FFF2-40B4-BE49-F238E27FC236}">
-                <a16:creationId xmlns:a16="http://schemas.microsoft.com/office/drawing/2014/main" id="{4D488829-11A0-8C65-48B0-723675529B9D}"/>
-              </a:ext>
-            </a:extLst>
-          </p:cNvPr>
-          <p:cNvSpPr>
-            <a:spLocks noGrp="1"/>
-          </p:cNvSpPr>
-          <p:nvPr>
-            <p:ph type="ctrTitle"/>
-          </p:nvPr>
-        </p:nvSpPr>
-        <p:spPr/>
-        <p:txBody>
-          <a:bodyPr/>
-          <a:lstStyle/>
-          <a:p>
-            <a:endParaRPr lang="en-US"/>
-          </a:p>
-        </p:txBody>
-      </p:sp>
-      <p:sp>
-        <p:nvSpPr>
-          <p:cNvPr id="3" name="Subtitle 2">
-            <a:extLst>
-              <a:ext uri="{FF2B5EF4-FFF2-40B4-BE49-F238E27FC236}">
-                <a16:creationId xmlns:a16="http://schemas.microsoft.com/office/drawing/2014/main" id="{857B05D7-C912-CDB7-5CBB-EDE8517774FF}"/>
-              </a:ext>
-            </a:extLst>
-          </p:cNvPr>
-          <p:cNvSpPr>
-            <a:spLocks noGrp="1"/>
-          </p:cNvSpPr>
-          <p:nvPr>
-            <p:ph type="subTitle" idx="1"/>
-          </p:nvPr>
-        </p:nvSpPr>
-        <p:spPr/>
-        <p:txBody>
-          <a:bodyPr/>
-          <a:lstStyle/>
-          <a:p>
-            <a:endParaRPr lang="en-US"/>
+      <p:pic>
+        <p:nvPicPr>
+          <p:cNvPr id="3" name="Picture 2">
+            <a:extLst>
+              <a:ext uri="{FF2B5EF4-FFF2-40B4-BE49-F238E27FC236}">
+                <a16:creationId xmlns:a16="http://schemas.microsoft.com/office/drawing/2014/main" id="{283AACDD-5FCB-38FB-31BC-99C75282DF3E}"/>
+              </a:ext>
+            </a:extLst>
+          </p:cNvPr>
+          <p:cNvPicPr>
+            <a:picLocks noChangeAspect="1"/>
+          </p:cNvPicPr>
+          <p:nvPr/>
+        </p:nvPicPr>
+        <p:blipFill>
+          <a:blip r:embed="rId2"/>
+          <a:stretch>
+            <a:fillRect/>
+          </a:stretch>
+        </p:blipFill>
+        <p:spPr>
+          <a:xfrm>
+            <a:off x="3269395" y="235428"/>
+            <a:ext cx="5340097" cy="5898752"/>
+          </a:xfrm>
+          <a:prstGeom prst="rect">
+            <a:avLst/>
+          </a:prstGeom>
+        </p:spPr>
+      </p:pic>
+      <p:cxnSp>
+        <p:nvCxnSpPr>
+          <p:cNvPr id="25" name="Straight Arrow Connector 24">
+            <a:extLst>
+              <a:ext uri="{FF2B5EF4-FFF2-40B4-BE49-F238E27FC236}">
+                <a16:creationId xmlns:a16="http://schemas.microsoft.com/office/drawing/2014/main" id="{22573BED-E083-0FE2-77FE-112D5018D159}"/>
+              </a:ext>
+            </a:extLst>
+          </p:cNvPr>
+          <p:cNvCxnSpPr>
+            <a:cxnSpLocks/>
+          </p:cNvCxnSpPr>
+          <p:nvPr/>
+        </p:nvCxnSpPr>
+        <p:spPr>
+          <a:xfrm>
+            <a:off x="2881560" y="1283470"/>
+            <a:ext cx="1184542" cy="485113"/>
+          </a:xfrm>
+          <a:prstGeom prst="straightConnector1">
+            <a:avLst/>
+          </a:prstGeom>
+          <a:ln w="38100">
+            <a:solidFill>
+              <a:srgbClr val="FF0000"/>
+            </a:solidFill>
+            <a:tailEnd type="triangle"/>
+          </a:ln>
+        </p:spPr>
+        <p:style>
+          <a:lnRef idx="1">
+            <a:schemeClr val="accent1"/>
+          </a:lnRef>
+          <a:fillRef idx="0">
+            <a:schemeClr val="accent1"/>
+          </a:fillRef>
+          <a:effectRef idx="0">
+            <a:schemeClr val="accent1"/>
+          </a:effectRef>
+          <a:fontRef idx="minor">
+            <a:schemeClr val="tx1"/>
+          </a:fontRef>
+        </p:style>
+      </p:cxnSp>
+      <p:cxnSp>
+        <p:nvCxnSpPr>
+          <p:cNvPr id="26" name="Straight Arrow Connector 25">
+            <a:extLst>
+              <a:ext uri="{FF2B5EF4-FFF2-40B4-BE49-F238E27FC236}">
+                <a16:creationId xmlns:a16="http://schemas.microsoft.com/office/drawing/2014/main" id="{DA1A0259-83A2-AF1F-ED24-28FDA53BEB5B}"/>
+              </a:ext>
+            </a:extLst>
+          </p:cNvPr>
+          <p:cNvCxnSpPr>
+            <a:cxnSpLocks/>
+          </p:cNvCxnSpPr>
+          <p:nvPr/>
+        </p:nvCxnSpPr>
+        <p:spPr>
+          <a:xfrm>
+            <a:off x="2878044" y="1741821"/>
+            <a:ext cx="910221" cy="366776"/>
+          </a:xfrm>
+          <a:prstGeom prst="straightConnector1">
+            <a:avLst/>
+          </a:prstGeom>
+          <a:ln w="38100">
+            <a:solidFill>
+              <a:srgbClr val="FF0000"/>
+            </a:solidFill>
+            <a:tailEnd type="triangle"/>
+          </a:ln>
+        </p:spPr>
+        <p:style>
+          <a:lnRef idx="1">
+            <a:schemeClr val="accent1"/>
+          </a:lnRef>
+          <a:fillRef idx="0">
+            <a:schemeClr val="accent1"/>
+          </a:fillRef>
+          <a:effectRef idx="0">
+            <a:schemeClr val="accent1"/>
+          </a:effectRef>
+          <a:fontRef idx="minor">
+            <a:schemeClr val="tx1"/>
+          </a:fontRef>
+        </p:style>
+      </p:cxnSp>
+      <p:cxnSp>
+        <p:nvCxnSpPr>
+          <p:cNvPr id="27" name="Straight Arrow Connector 26">
+            <a:extLst>
+              <a:ext uri="{FF2B5EF4-FFF2-40B4-BE49-F238E27FC236}">
+                <a16:creationId xmlns:a16="http://schemas.microsoft.com/office/drawing/2014/main" id="{1D0C4E32-6BB6-6B5E-A4EE-1B6E7DD70530}"/>
+              </a:ext>
+            </a:extLst>
+          </p:cNvPr>
+          <p:cNvCxnSpPr>
+            <a:cxnSpLocks/>
+          </p:cNvCxnSpPr>
+          <p:nvPr/>
+        </p:nvCxnSpPr>
+        <p:spPr>
+          <a:xfrm>
+            <a:off x="2881560" y="2997926"/>
+            <a:ext cx="1184542" cy="407587"/>
+          </a:xfrm>
+          <a:prstGeom prst="straightConnector1">
+            <a:avLst/>
+          </a:prstGeom>
+          <a:ln w="38100">
+            <a:solidFill>
+              <a:srgbClr val="FF0000"/>
+            </a:solidFill>
+            <a:tailEnd type="triangle"/>
+          </a:ln>
+        </p:spPr>
+        <p:style>
+          <a:lnRef idx="1">
+            <a:schemeClr val="accent1"/>
+          </a:lnRef>
+          <a:fillRef idx="0">
+            <a:schemeClr val="accent1"/>
+          </a:fillRef>
+          <a:effectRef idx="0">
+            <a:schemeClr val="accent1"/>
+          </a:effectRef>
+          <a:fontRef idx="minor">
+            <a:schemeClr val="tx1"/>
+          </a:fontRef>
+        </p:style>
+      </p:cxnSp>
+      <p:cxnSp>
+        <p:nvCxnSpPr>
+          <p:cNvPr id="29" name="Straight Arrow Connector 28">
+            <a:extLst>
+              <a:ext uri="{FF2B5EF4-FFF2-40B4-BE49-F238E27FC236}">
+                <a16:creationId xmlns:a16="http://schemas.microsoft.com/office/drawing/2014/main" id="{41EEC5F0-CC96-B795-448F-2CF9ED66DE19}"/>
+              </a:ext>
+            </a:extLst>
+          </p:cNvPr>
+          <p:cNvCxnSpPr>
+            <a:cxnSpLocks/>
+            <a:stCxn id="47" idx="3"/>
+          </p:cNvCxnSpPr>
+          <p:nvPr/>
+        </p:nvCxnSpPr>
+        <p:spPr>
+          <a:xfrm>
+            <a:off x="2878044" y="4534458"/>
+            <a:ext cx="1445623" cy="490676"/>
+          </a:xfrm>
+          <a:prstGeom prst="straightConnector1">
+            <a:avLst/>
+          </a:prstGeom>
+          <a:ln w="38100">
+            <a:solidFill>
+              <a:srgbClr val="FF0000"/>
+            </a:solidFill>
+            <a:tailEnd type="triangle"/>
+          </a:ln>
+        </p:spPr>
+        <p:style>
+          <a:lnRef idx="1">
+            <a:schemeClr val="accent1"/>
+          </a:lnRef>
+          <a:fillRef idx="0">
+            <a:schemeClr val="accent1"/>
+          </a:fillRef>
+          <a:effectRef idx="0">
+            <a:schemeClr val="accent1"/>
+          </a:effectRef>
+          <a:fontRef idx="minor">
+            <a:schemeClr val="tx1"/>
+          </a:fontRef>
+        </p:style>
+      </p:cxnSp>
+      <p:cxnSp>
+        <p:nvCxnSpPr>
+          <p:cNvPr id="31" name="Straight Arrow Connector 30">
+            <a:extLst>
+              <a:ext uri="{FF2B5EF4-FFF2-40B4-BE49-F238E27FC236}">
+                <a16:creationId xmlns:a16="http://schemas.microsoft.com/office/drawing/2014/main" id="{71CDF0A9-F3D9-3161-E605-85404D49EBEF}"/>
+              </a:ext>
+            </a:extLst>
+          </p:cNvPr>
+          <p:cNvCxnSpPr>
+            <a:cxnSpLocks/>
+            <a:stCxn id="49" idx="1"/>
+          </p:cNvCxnSpPr>
+          <p:nvPr/>
+        </p:nvCxnSpPr>
+        <p:spPr>
+          <a:xfrm flipH="1">
+            <a:off x="7461849" y="2862489"/>
+            <a:ext cx="1476898" cy="1175446"/>
+          </a:xfrm>
+          <a:prstGeom prst="straightConnector1">
+            <a:avLst/>
+          </a:prstGeom>
+          <a:ln w="38100">
+            <a:solidFill>
+              <a:srgbClr val="FF0000"/>
+            </a:solidFill>
+            <a:tailEnd type="triangle"/>
+          </a:ln>
+        </p:spPr>
+        <p:style>
+          <a:lnRef idx="1">
+            <a:schemeClr val="accent1"/>
+          </a:lnRef>
+          <a:fillRef idx="0">
+            <a:schemeClr val="accent1"/>
+          </a:fillRef>
+          <a:effectRef idx="0">
+            <a:schemeClr val="accent1"/>
+          </a:effectRef>
+          <a:fontRef idx="minor">
+            <a:schemeClr val="tx1"/>
+          </a:fontRef>
+        </p:style>
+      </p:cxnSp>
+      <p:cxnSp>
+        <p:nvCxnSpPr>
+          <p:cNvPr id="34" name="Straight Arrow Connector 33">
+            <a:extLst>
+              <a:ext uri="{FF2B5EF4-FFF2-40B4-BE49-F238E27FC236}">
+                <a16:creationId xmlns:a16="http://schemas.microsoft.com/office/drawing/2014/main" id="{C1F77F40-2B06-4412-5542-A92656710790}"/>
+              </a:ext>
+            </a:extLst>
+          </p:cNvPr>
+          <p:cNvCxnSpPr>
+            <a:cxnSpLocks/>
+            <a:stCxn id="48" idx="1"/>
+          </p:cNvCxnSpPr>
+          <p:nvPr/>
+        </p:nvCxnSpPr>
+        <p:spPr>
+          <a:xfrm flipH="1">
+            <a:off x="7602759" y="2262730"/>
+            <a:ext cx="1335988" cy="1049005"/>
+          </a:xfrm>
+          <a:prstGeom prst="straightConnector1">
+            <a:avLst/>
+          </a:prstGeom>
+          <a:ln w="38100">
+            <a:solidFill>
+              <a:srgbClr val="FF0000"/>
+            </a:solidFill>
+            <a:tailEnd type="triangle"/>
+          </a:ln>
+        </p:spPr>
+        <p:style>
+          <a:lnRef idx="1">
+            <a:schemeClr val="accent1"/>
+          </a:lnRef>
+          <a:fillRef idx="0">
+            <a:schemeClr val="accent1"/>
+          </a:fillRef>
+          <a:effectRef idx="0">
+            <a:schemeClr val="accent1"/>
+          </a:effectRef>
+          <a:fontRef idx="minor">
+            <a:schemeClr val="tx1"/>
+          </a:fontRef>
+        </p:style>
+      </p:cxnSp>
+      <p:cxnSp>
+        <p:nvCxnSpPr>
+          <p:cNvPr id="36" name="Straight Arrow Connector 35">
+            <a:extLst>
+              <a:ext uri="{FF2B5EF4-FFF2-40B4-BE49-F238E27FC236}">
+                <a16:creationId xmlns:a16="http://schemas.microsoft.com/office/drawing/2014/main" id="{6C56048B-8988-9F72-CD63-9EDCFF936335}"/>
+              </a:ext>
+            </a:extLst>
+          </p:cNvPr>
+          <p:cNvCxnSpPr>
+            <a:cxnSpLocks/>
+          </p:cNvCxnSpPr>
+          <p:nvPr/>
+        </p:nvCxnSpPr>
+        <p:spPr>
+          <a:xfrm>
+            <a:off x="2881560" y="2153192"/>
+            <a:ext cx="1741890" cy="701042"/>
+          </a:xfrm>
+          <a:prstGeom prst="straightConnector1">
+            <a:avLst/>
+          </a:prstGeom>
+          <a:ln w="38100">
+            <a:solidFill>
+              <a:srgbClr val="FF0000"/>
+            </a:solidFill>
+            <a:tailEnd type="triangle"/>
+          </a:ln>
+        </p:spPr>
+        <p:style>
+          <a:lnRef idx="1">
+            <a:schemeClr val="accent1"/>
+          </a:lnRef>
+          <a:fillRef idx="0">
+            <a:schemeClr val="accent1"/>
+          </a:fillRef>
+          <a:effectRef idx="0">
+            <a:schemeClr val="accent1"/>
+          </a:effectRef>
+          <a:fontRef idx="minor">
+            <a:schemeClr val="tx1"/>
+          </a:fontRef>
+        </p:style>
+      </p:cxnSp>
+      <p:sp>
+        <p:nvSpPr>
+          <p:cNvPr id="43" name="TextBox 42">
+            <a:extLst>
+              <a:ext uri="{FF2B5EF4-FFF2-40B4-BE49-F238E27FC236}">
+                <a16:creationId xmlns:a16="http://schemas.microsoft.com/office/drawing/2014/main" id="{48A91F50-0646-52F8-9E62-D2FC54CF3B89}"/>
+              </a:ext>
+            </a:extLst>
+          </p:cNvPr>
+          <p:cNvSpPr txBox="1"/>
+          <p:nvPr/>
+        </p:nvSpPr>
+        <p:spPr>
+          <a:xfrm>
+            <a:off x="628186" y="1043364"/>
+            <a:ext cx="2253374" cy="400110"/>
+          </a:xfrm>
+          <a:prstGeom prst="rect">
+            <a:avLst/>
+          </a:prstGeom>
+          <a:noFill/>
+        </p:spPr>
+        <p:txBody>
+          <a:bodyPr wrap="none" rtlCol="0">
+            <a:spAutoFit/>
+          </a:bodyPr>
+          <a:lstStyle/>
+          <a:p>
+            <a:r>
+              <a:rPr lang="en-US" sz="2000" dirty="0"/>
+              <a:t>Tactile switch board</a:t>
+            </a:r>
+          </a:p>
+        </p:txBody>
+      </p:sp>
+      <p:sp>
+        <p:nvSpPr>
+          <p:cNvPr id="44" name="TextBox 43">
+            <a:extLst>
+              <a:ext uri="{FF2B5EF4-FFF2-40B4-BE49-F238E27FC236}">
+                <a16:creationId xmlns:a16="http://schemas.microsoft.com/office/drawing/2014/main" id="{0C3246D9-1255-940A-78FC-017784B557FB}"/>
+              </a:ext>
+            </a:extLst>
+          </p:cNvPr>
+          <p:cNvSpPr txBox="1"/>
+          <p:nvPr/>
+        </p:nvSpPr>
+        <p:spPr>
+          <a:xfrm>
+            <a:off x="936102" y="1517983"/>
+            <a:ext cx="1941942" cy="400110"/>
+          </a:xfrm>
+          <a:prstGeom prst="rect">
+            <a:avLst/>
+          </a:prstGeom>
+          <a:noFill/>
+        </p:spPr>
+        <p:txBody>
+          <a:bodyPr wrap="none" rtlCol="0">
+            <a:spAutoFit/>
+          </a:bodyPr>
+          <a:lstStyle/>
+          <a:p>
+            <a:r>
+              <a:rPr lang="en-US" sz="2000" dirty="0"/>
+              <a:t>Connector board</a:t>
+            </a:r>
+          </a:p>
+        </p:txBody>
+      </p:sp>
+      <p:sp>
+        <p:nvSpPr>
+          <p:cNvPr id="45" name="TextBox 44">
+            <a:extLst>
+              <a:ext uri="{FF2B5EF4-FFF2-40B4-BE49-F238E27FC236}">
+                <a16:creationId xmlns:a16="http://schemas.microsoft.com/office/drawing/2014/main" id="{534D1ED7-D42F-BED3-A8E5-E665070EF0F2}"/>
+              </a:ext>
+            </a:extLst>
+          </p:cNvPr>
+          <p:cNvSpPr txBox="1"/>
+          <p:nvPr/>
+        </p:nvSpPr>
+        <p:spPr>
+          <a:xfrm>
+            <a:off x="1252909" y="1943920"/>
+            <a:ext cx="1628651" cy="400110"/>
+          </a:xfrm>
+          <a:prstGeom prst="rect">
+            <a:avLst/>
+          </a:prstGeom>
+          <a:noFill/>
+        </p:spPr>
+        <p:txBody>
+          <a:bodyPr wrap="none" rtlCol="0">
+            <a:spAutoFit/>
+          </a:bodyPr>
+          <a:lstStyle/>
+          <a:p>
+            <a:r>
+              <a:rPr lang="en-US" sz="2000" dirty="0"/>
+              <a:t>100mAh Li-Po</a:t>
+            </a:r>
+          </a:p>
+        </p:txBody>
+      </p:sp>
+      <p:sp>
+        <p:nvSpPr>
+          <p:cNvPr id="46" name="TextBox 45">
+            <a:extLst>
+              <a:ext uri="{FF2B5EF4-FFF2-40B4-BE49-F238E27FC236}">
+                <a16:creationId xmlns:a16="http://schemas.microsoft.com/office/drawing/2014/main" id="{11F8383D-6645-B9D6-86B6-266CA6CBB899}"/>
+              </a:ext>
+            </a:extLst>
+          </p:cNvPr>
+          <p:cNvSpPr txBox="1"/>
+          <p:nvPr/>
+        </p:nvSpPr>
+        <p:spPr>
+          <a:xfrm>
+            <a:off x="360229" y="2784988"/>
+            <a:ext cx="2521331" cy="400110"/>
+          </a:xfrm>
+          <a:prstGeom prst="rect">
+            <a:avLst/>
+          </a:prstGeom>
+          <a:noFill/>
+        </p:spPr>
+        <p:txBody>
+          <a:bodyPr wrap="none" rtlCol="0">
+            <a:spAutoFit/>
+          </a:bodyPr>
+          <a:lstStyle/>
+          <a:p>
+            <a:r>
+              <a:rPr lang="en-US" sz="2000" dirty="0"/>
+              <a:t>Linear vibration motor</a:t>
+            </a:r>
+          </a:p>
+        </p:txBody>
+      </p:sp>
+      <p:sp>
+        <p:nvSpPr>
+          <p:cNvPr id="47" name="TextBox 46">
+            <a:extLst>
+              <a:ext uri="{FF2B5EF4-FFF2-40B4-BE49-F238E27FC236}">
+                <a16:creationId xmlns:a16="http://schemas.microsoft.com/office/drawing/2014/main" id="{C9B700B5-F80E-FA70-C1A4-9CB4551553C9}"/>
+              </a:ext>
+            </a:extLst>
+          </p:cNvPr>
+          <p:cNvSpPr txBox="1"/>
+          <p:nvPr/>
+        </p:nvSpPr>
+        <p:spPr>
+          <a:xfrm>
+            <a:off x="687316" y="4334403"/>
+            <a:ext cx="2190728" cy="400110"/>
+          </a:xfrm>
+          <a:prstGeom prst="rect">
+            <a:avLst/>
+          </a:prstGeom>
+          <a:noFill/>
+        </p:spPr>
+        <p:txBody>
+          <a:bodyPr wrap="none" rtlCol="0">
+            <a:spAutoFit/>
+          </a:bodyPr>
+          <a:lstStyle/>
+          <a:p>
+            <a:r>
+              <a:rPr lang="en-US" sz="2000" dirty="0"/>
+              <a:t>Main control board</a:t>
+            </a:r>
+          </a:p>
+        </p:txBody>
+      </p:sp>
+      <p:sp>
+        <p:nvSpPr>
+          <p:cNvPr id="48" name="TextBox 47">
+            <a:extLst>
+              <a:ext uri="{FF2B5EF4-FFF2-40B4-BE49-F238E27FC236}">
+                <a16:creationId xmlns:a16="http://schemas.microsoft.com/office/drawing/2014/main" id="{D3EBD980-6106-D77D-873D-6C2B3E2129EF}"/>
+              </a:ext>
+            </a:extLst>
+          </p:cNvPr>
+          <p:cNvSpPr txBox="1"/>
+          <p:nvPr/>
+        </p:nvSpPr>
+        <p:spPr>
+          <a:xfrm>
+            <a:off x="8938747" y="2062675"/>
+            <a:ext cx="1817613" cy="400110"/>
+          </a:xfrm>
+          <a:prstGeom prst="rect">
+            <a:avLst/>
+          </a:prstGeom>
+          <a:noFill/>
+        </p:spPr>
+        <p:txBody>
+          <a:bodyPr wrap="none" rtlCol="0">
+            <a:spAutoFit/>
+          </a:bodyPr>
+          <a:lstStyle/>
+          <a:p>
+            <a:r>
+              <a:rPr lang="en-US" sz="2000" dirty="0"/>
+              <a:t>Mouse encoder</a:t>
+            </a:r>
+          </a:p>
+        </p:txBody>
+      </p:sp>
+      <p:sp>
+        <p:nvSpPr>
+          <p:cNvPr id="49" name="TextBox 48">
+            <a:extLst>
+              <a:ext uri="{FF2B5EF4-FFF2-40B4-BE49-F238E27FC236}">
+                <a16:creationId xmlns:a16="http://schemas.microsoft.com/office/drawing/2014/main" id="{3E34B49F-7780-4840-4E28-CF93E5006A16}"/>
+              </a:ext>
+            </a:extLst>
+          </p:cNvPr>
+          <p:cNvSpPr txBox="1"/>
+          <p:nvPr/>
+        </p:nvSpPr>
+        <p:spPr>
+          <a:xfrm>
+            <a:off x="8938747" y="2662434"/>
+            <a:ext cx="982770" cy="400110"/>
+          </a:xfrm>
+          <a:prstGeom prst="rect">
+            <a:avLst/>
+          </a:prstGeom>
+          <a:noFill/>
+        </p:spPr>
+        <p:txBody>
+          <a:bodyPr wrap="none" rtlCol="0">
+            <a:spAutoFit/>
+          </a:bodyPr>
+          <a:lstStyle/>
+          <a:p>
+            <a:r>
+              <a:rPr lang="en-US" sz="2000" dirty="0"/>
+              <a:t>Joystick</a:t>
+            </a:r>
+          </a:p>
+        </p:txBody>
+      </p:sp>
+      <p:sp>
+        <p:nvSpPr>
+          <p:cNvPr id="63" name="TextBox 62">
+            <a:extLst>
+              <a:ext uri="{FF2B5EF4-FFF2-40B4-BE49-F238E27FC236}">
+                <a16:creationId xmlns:a16="http://schemas.microsoft.com/office/drawing/2014/main" id="{B9FD7771-DBAE-BD67-F5D6-B8A070D7A538}"/>
+              </a:ext>
+            </a:extLst>
+          </p:cNvPr>
+          <p:cNvSpPr txBox="1"/>
+          <p:nvPr/>
+        </p:nvSpPr>
+        <p:spPr>
+          <a:xfrm>
+            <a:off x="8938747" y="1480187"/>
+            <a:ext cx="1414170" cy="400110"/>
+          </a:xfrm>
+          <a:prstGeom prst="rect">
+            <a:avLst/>
+          </a:prstGeom>
+          <a:noFill/>
+        </p:spPr>
+        <p:txBody>
+          <a:bodyPr wrap="none" rtlCol="0">
+            <a:spAutoFit/>
+          </a:bodyPr>
+          <a:lstStyle/>
+          <a:p>
+            <a:r>
+              <a:rPr lang="en-US" sz="2000" dirty="0"/>
+              <a:t>Ball bearing</a:t>
+            </a:r>
+          </a:p>
+        </p:txBody>
+      </p:sp>
+      <p:cxnSp>
+        <p:nvCxnSpPr>
+          <p:cNvPr id="64" name="Straight Arrow Connector 63">
+            <a:extLst>
+              <a:ext uri="{FF2B5EF4-FFF2-40B4-BE49-F238E27FC236}">
+                <a16:creationId xmlns:a16="http://schemas.microsoft.com/office/drawing/2014/main" id="{B90EB86F-6B25-32C0-8188-49265FD794B1}"/>
+              </a:ext>
+            </a:extLst>
+          </p:cNvPr>
+          <p:cNvCxnSpPr>
+            <a:cxnSpLocks/>
+            <a:stCxn id="63" idx="1"/>
+          </p:cNvCxnSpPr>
+          <p:nvPr/>
+        </p:nvCxnSpPr>
+        <p:spPr>
+          <a:xfrm flipH="1">
+            <a:off x="7794553" y="1680242"/>
+            <a:ext cx="1144194" cy="904147"/>
+          </a:xfrm>
+          <a:prstGeom prst="straightConnector1">
+            <a:avLst/>
+          </a:prstGeom>
+          <a:ln w="38100">
+            <a:solidFill>
+              <a:srgbClr val="FF0000"/>
+            </a:solidFill>
+            <a:tailEnd type="triangle"/>
+          </a:ln>
+        </p:spPr>
+        <p:style>
+          <a:lnRef idx="1">
+            <a:schemeClr val="accent1"/>
+          </a:lnRef>
+          <a:fillRef idx="0">
+            <a:schemeClr val="accent1"/>
+          </a:fillRef>
+          <a:effectRef idx="0">
+            <a:schemeClr val="accent1"/>
+          </a:effectRef>
+          <a:fontRef idx="minor">
+            <a:schemeClr val="tx1"/>
+          </a:fontRef>
+        </p:style>
+      </p:cxnSp>
+      <p:pic>
+        <p:nvPicPr>
+          <p:cNvPr id="71" name="Picture 70">
+            <a:extLst>
+              <a:ext uri="{FF2B5EF4-FFF2-40B4-BE49-F238E27FC236}">
+                <a16:creationId xmlns:a16="http://schemas.microsoft.com/office/drawing/2014/main" id="{D1E89745-466A-9459-E0E0-C404837992BC}"/>
+              </a:ext>
+            </a:extLst>
+          </p:cNvPr>
+          <p:cNvPicPr>
+            <a:picLocks noChangeAspect="1"/>
+          </p:cNvPicPr>
+          <p:nvPr/>
+        </p:nvPicPr>
+        <p:blipFill>
+          <a:blip r:embed="rId3"/>
+          <a:stretch>
+            <a:fillRect/>
+          </a:stretch>
+        </p:blipFill>
+        <p:spPr>
+          <a:xfrm>
+            <a:off x="9034921" y="3633644"/>
+            <a:ext cx="2429581" cy="2517397"/>
+          </a:xfrm>
+          <a:prstGeom prst="rect">
+            <a:avLst/>
+          </a:prstGeom>
+        </p:spPr>
+      </p:pic>
+      <p:cxnSp>
+        <p:nvCxnSpPr>
+          <p:cNvPr id="99" name="Straight Arrow Connector 98">
+            <a:extLst>
+              <a:ext uri="{FF2B5EF4-FFF2-40B4-BE49-F238E27FC236}">
+                <a16:creationId xmlns:a16="http://schemas.microsoft.com/office/drawing/2014/main" id="{EA878AB7-B034-5E9F-39B9-2EA9ABAA74AB}"/>
+              </a:ext>
+            </a:extLst>
+          </p:cNvPr>
+          <p:cNvCxnSpPr>
+            <a:cxnSpLocks/>
+          </p:cNvCxnSpPr>
+          <p:nvPr/>
+        </p:nvCxnSpPr>
+        <p:spPr>
+          <a:xfrm flipV="1">
+            <a:off x="9044108" y="3601742"/>
+            <a:ext cx="1542171" cy="206453"/>
+          </a:xfrm>
+          <a:prstGeom prst="straightConnector1">
+            <a:avLst/>
+          </a:prstGeom>
+          <a:ln w="38100">
+            <a:headEnd type="triangle" w="med" len="med"/>
+            <a:tailEnd type="triangle" w="med" len="med"/>
+          </a:ln>
+        </p:spPr>
+        <p:style>
+          <a:lnRef idx="1">
+            <a:schemeClr val="accent1"/>
+          </a:lnRef>
+          <a:fillRef idx="0">
+            <a:schemeClr val="accent1"/>
+          </a:fillRef>
+          <a:effectRef idx="0">
+            <a:schemeClr val="accent1"/>
+          </a:effectRef>
+          <a:fontRef idx="minor">
+            <a:schemeClr val="tx1"/>
+          </a:fontRef>
+        </p:style>
+      </p:cxnSp>
+      <p:cxnSp>
+        <p:nvCxnSpPr>
+          <p:cNvPr id="102" name="Straight Arrow Connector 101">
+            <a:extLst>
+              <a:ext uri="{FF2B5EF4-FFF2-40B4-BE49-F238E27FC236}">
+                <a16:creationId xmlns:a16="http://schemas.microsoft.com/office/drawing/2014/main" id="{DA5CFF2B-E236-F7CF-2DC0-72FAC12353D6}"/>
+              </a:ext>
+            </a:extLst>
+          </p:cNvPr>
+          <p:cNvCxnSpPr>
+            <a:cxnSpLocks/>
+          </p:cNvCxnSpPr>
+          <p:nvPr/>
+        </p:nvCxnSpPr>
+        <p:spPr>
+          <a:xfrm>
+            <a:off x="9044108" y="3824808"/>
+            <a:ext cx="0" cy="1739445"/>
+          </a:xfrm>
+          <a:prstGeom prst="straightConnector1">
+            <a:avLst/>
+          </a:prstGeom>
+          <a:ln w="38100">
+            <a:headEnd type="triangle" w="med" len="med"/>
+            <a:tailEnd type="triangle" w="med" len="med"/>
+          </a:ln>
+        </p:spPr>
+        <p:style>
+          <a:lnRef idx="1">
+            <a:schemeClr val="accent1"/>
+          </a:lnRef>
+          <a:fillRef idx="0">
+            <a:schemeClr val="accent1"/>
+          </a:fillRef>
+          <a:effectRef idx="0">
+            <a:schemeClr val="accent1"/>
+          </a:effectRef>
+          <a:fontRef idx="minor">
+            <a:schemeClr val="tx1"/>
+          </a:fontRef>
+        </p:style>
+      </p:cxnSp>
+      <p:cxnSp>
+        <p:nvCxnSpPr>
+          <p:cNvPr id="105" name="Straight Arrow Connector 104">
+            <a:extLst>
+              <a:ext uri="{FF2B5EF4-FFF2-40B4-BE49-F238E27FC236}">
+                <a16:creationId xmlns:a16="http://schemas.microsoft.com/office/drawing/2014/main" id="{58C5AE38-F2E8-1AF7-ADE8-1DB63513851F}"/>
+              </a:ext>
+            </a:extLst>
+          </p:cNvPr>
+          <p:cNvCxnSpPr>
+            <a:cxnSpLocks/>
+          </p:cNvCxnSpPr>
+          <p:nvPr/>
+        </p:nvCxnSpPr>
+        <p:spPr>
+          <a:xfrm flipH="1" flipV="1">
+            <a:off x="9034921" y="5592704"/>
+            <a:ext cx="666284" cy="537234"/>
+          </a:xfrm>
+          <a:prstGeom prst="straightConnector1">
+            <a:avLst/>
+          </a:prstGeom>
+          <a:ln w="38100">
+            <a:headEnd type="triangle" w="med" len="med"/>
+            <a:tailEnd type="triangle" w="med" len="med"/>
+          </a:ln>
+        </p:spPr>
+        <p:style>
+          <a:lnRef idx="1">
+            <a:schemeClr val="accent1"/>
+          </a:lnRef>
+          <a:fillRef idx="0">
+            <a:schemeClr val="accent1"/>
+          </a:fillRef>
+          <a:effectRef idx="0">
+            <a:schemeClr val="accent1"/>
+          </a:effectRef>
+          <a:fontRef idx="minor">
+            <a:schemeClr val="tx1"/>
+          </a:fontRef>
+        </p:style>
+      </p:cxnSp>
+      <p:sp>
+        <p:nvSpPr>
+          <p:cNvPr id="109" name="TextBox 108">
+            <a:extLst>
+              <a:ext uri="{FF2B5EF4-FFF2-40B4-BE49-F238E27FC236}">
+                <a16:creationId xmlns:a16="http://schemas.microsoft.com/office/drawing/2014/main" id="{32C96EFE-1DC1-C024-8FCF-1FB41F63DAFF}"/>
+              </a:ext>
+            </a:extLst>
+          </p:cNvPr>
+          <p:cNvSpPr txBox="1"/>
+          <p:nvPr/>
+        </p:nvSpPr>
+        <p:spPr>
+          <a:xfrm rot="21113462">
+            <a:off x="9319395" y="3294825"/>
+            <a:ext cx="854721" cy="400110"/>
+          </a:xfrm>
+          <a:prstGeom prst="rect">
+            <a:avLst/>
+          </a:prstGeom>
+          <a:noFill/>
+        </p:spPr>
+        <p:txBody>
+          <a:bodyPr wrap="none" rtlCol="0">
+            <a:spAutoFit/>
+          </a:bodyPr>
+          <a:lstStyle/>
+          <a:p>
+            <a:r>
+              <a:rPr lang="en-US" sz="2000" dirty="0">
+                <a:solidFill>
+                  <a:schemeClr val="accent1">
+                    <a:lumMod val="75000"/>
+                  </a:schemeClr>
+                </a:solidFill>
+              </a:rPr>
+              <a:t>33mm</a:t>
+            </a:r>
+          </a:p>
+        </p:txBody>
+      </p:sp>
+      <p:sp>
+        <p:nvSpPr>
+          <p:cNvPr id="110" name="TextBox 109">
+            <a:extLst>
+              <a:ext uri="{FF2B5EF4-FFF2-40B4-BE49-F238E27FC236}">
+                <a16:creationId xmlns:a16="http://schemas.microsoft.com/office/drawing/2014/main" id="{FDBC9252-A406-C4B6-8993-A1288A9F2A24}"/>
+              </a:ext>
+            </a:extLst>
+          </p:cNvPr>
+          <p:cNvSpPr txBox="1"/>
+          <p:nvPr/>
+        </p:nvSpPr>
+        <p:spPr>
+          <a:xfrm rot="16200000">
+            <a:off x="8429725" y="4548937"/>
+            <a:ext cx="854721" cy="400110"/>
+          </a:xfrm>
+          <a:prstGeom prst="rect">
+            <a:avLst/>
+          </a:prstGeom>
+          <a:noFill/>
+        </p:spPr>
+        <p:txBody>
+          <a:bodyPr wrap="none" rtlCol="0">
+            <a:spAutoFit/>
+          </a:bodyPr>
+          <a:lstStyle/>
+          <a:p>
+            <a:r>
+              <a:rPr lang="en-US" sz="2000" dirty="0">
+                <a:solidFill>
+                  <a:schemeClr val="accent1">
+                    <a:lumMod val="75000"/>
+                  </a:schemeClr>
+                </a:solidFill>
+              </a:rPr>
+              <a:t>33mm</a:t>
+            </a:r>
+          </a:p>
+        </p:txBody>
+      </p:sp>
+      <p:sp>
+        <p:nvSpPr>
+          <p:cNvPr id="111" name="TextBox 110">
+            <a:extLst>
+              <a:ext uri="{FF2B5EF4-FFF2-40B4-BE49-F238E27FC236}">
+                <a16:creationId xmlns:a16="http://schemas.microsoft.com/office/drawing/2014/main" id="{E01321EF-CBDA-0594-ECF3-3AA892E73E4E}"/>
+              </a:ext>
+            </a:extLst>
+          </p:cNvPr>
+          <p:cNvSpPr txBox="1"/>
+          <p:nvPr/>
+        </p:nvSpPr>
+        <p:spPr>
+          <a:xfrm rot="2317042">
+            <a:off x="8806480" y="5831117"/>
+            <a:ext cx="854721" cy="400110"/>
+          </a:xfrm>
+          <a:prstGeom prst="rect">
+            <a:avLst/>
+          </a:prstGeom>
+          <a:noFill/>
+        </p:spPr>
+        <p:txBody>
+          <a:bodyPr wrap="none" rtlCol="0">
+            <a:spAutoFit/>
+          </a:bodyPr>
+          <a:lstStyle/>
+          <a:p>
+            <a:r>
+              <a:rPr lang="en-US" sz="2000" dirty="0">
+                <a:solidFill>
+                  <a:schemeClr val="accent1">
+                    <a:lumMod val="75000"/>
+                  </a:schemeClr>
+                </a:solidFill>
+              </a:rPr>
+              <a:t>33mm</a:t>
+            </a:r>
           </a:p>
         </p:txBody>
       </p:sp>
     </p:spTree>
     <p:extLst>
       <p:ext uri="{BB962C8B-B14F-4D97-AF65-F5344CB8AC3E}">
-        <p14:creationId xmlns:p14="http://schemas.microsoft.com/office/powerpoint/2010/main" val="4094565798"/>
+        <p14:creationId xmlns:p14="http://schemas.microsoft.com/office/powerpoint/2010/main" val="1369145088"/>
+      </p:ext>
+    </p:extLst>
+  </p:cSld>
+  <p:clrMapOvr>
+    <a:masterClrMapping/>
+  </p:clrMapOvr>
+</p:sld>
+</file>
+
+<file path=ppt/slides/slide2.xml><?xml version="1.0" encoding="utf-8"?>
+<p:sld xmlns:a="http://schemas.openxmlformats.org/drawingml/2006/main" xmlns:r="http://schemas.openxmlformats.org/officeDocument/2006/relationships" xmlns:p="http://schemas.openxmlformats.org/presentationml/2006/main">
+  <p:cSld>
+    <p:spTree>
+      <p:nvGrpSpPr>
+        <p:cNvPr id="1" name=""/>
+        <p:cNvGrpSpPr/>
+        <p:nvPr/>
+      </p:nvGrpSpPr>
+      <p:grpSpPr>
+        <a:xfrm>
+          <a:off x="0" y="0"/>
+          <a:ext cx="0" cy="0"/>
+          <a:chOff x="0" y="0"/>
+          <a:chExt cx="0" cy="0"/>
+        </a:xfrm>
+      </p:grpSpPr>
+      <p:pic>
+        <p:nvPicPr>
+          <p:cNvPr id="7" name="Picture 6">
+            <a:extLst>
+              <a:ext uri="{FF2B5EF4-FFF2-40B4-BE49-F238E27FC236}">
+                <a16:creationId xmlns:a16="http://schemas.microsoft.com/office/drawing/2014/main" id="{761F6A94-6F04-1732-A358-572F76D74201}"/>
+              </a:ext>
+            </a:extLst>
+          </p:cNvPr>
+          <p:cNvPicPr>
+            <a:picLocks noChangeAspect="1"/>
+          </p:cNvPicPr>
+          <p:nvPr/>
+        </p:nvPicPr>
+        <p:blipFill>
+          <a:blip r:embed="rId2"/>
+          <a:stretch>
+            <a:fillRect/>
+          </a:stretch>
+        </p:blipFill>
+        <p:spPr>
+          <a:xfrm>
+            <a:off x="3260050" y="1444607"/>
+            <a:ext cx="5089292" cy="4360672"/>
+          </a:xfrm>
+          <a:prstGeom prst="rect">
+            <a:avLst/>
+          </a:prstGeom>
+        </p:spPr>
+      </p:pic>
+      <p:cxnSp>
+        <p:nvCxnSpPr>
+          <p:cNvPr id="3" name="Straight Arrow Connector 2">
+            <a:extLst>
+              <a:ext uri="{FF2B5EF4-FFF2-40B4-BE49-F238E27FC236}">
+                <a16:creationId xmlns:a16="http://schemas.microsoft.com/office/drawing/2014/main" id="{774ADA04-35FD-1D6F-C15E-808573CC76AA}"/>
+              </a:ext>
+            </a:extLst>
+          </p:cNvPr>
+          <p:cNvCxnSpPr>
+            <a:cxnSpLocks/>
+          </p:cNvCxnSpPr>
+          <p:nvPr/>
+        </p:nvCxnSpPr>
+        <p:spPr>
+          <a:xfrm>
+            <a:off x="2754086" y="3145971"/>
+            <a:ext cx="1338943" cy="870858"/>
+          </a:xfrm>
+          <a:prstGeom prst="straightConnector1">
+            <a:avLst/>
+          </a:prstGeom>
+          <a:ln w="76200">
+            <a:solidFill>
+              <a:srgbClr val="FF0000"/>
+            </a:solidFill>
+            <a:tailEnd type="triangle"/>
+          </a:ln>
+        </p:spPr>
+        <p:style>
+          <a:lnRef idx="1">
+            <a:schemeClr val="accent1"/>
+          </a:lnRef>
+          <a:fillRef idx="0">
+            <a:schemeClr val="accent1"/>
+          </a:fillRef>
+          <a:effectRef idx="0">
+            <a:schemeClr val="accent1"/>
+          </a:effectRef>
+          <a:fontRef idx="minor">
+            <a:schemeClr val="tx1"/>
+          </a:fontRef>
+        </p:style>
+      </p:cxnSp>
+      <p:cxnSp>
+        <p:nvCxnSpPr>
+          <p:cNvPr id="4" name="Straight Arrow Connector 3">
+            <a:extLst>
+              <a:ext uri="{FF2B5EF4-FFF2-40B4-BE49-F238E27FC236}">
+                <a16:creationId xmlns:a16="http://schemas.microsoft.com/office/drawing/2014/main" id="{244A9888-0E94-8547-3C25-CDE140259B8F}"/>
+              </a:ext>
+            </a:extLst>
+          </p:cNvPr>
+          <p:cNvCxnSpPr>
+            <a:cxnSpLocks/>
+          </p:cNvCxnSpPr>
+          <p:nvPr/>
+        </p:nvCxnSpPr>
+        <p:spPr>
+          <a:xfrm flipH="1">
+            <a:off x="6629402" y="2710543"/>
+            <a:ext cx="2144483" cy="1197428"/>
+          </a:xfrm>
+          <a:prstGeom prst="straightConnector1">
+            <a:avLst/>
+          </a:prstGeom>
+          <a:ln w="76200">
+            <a:solidFill>
+              <a:srgbClr val="FF0000"/>
+            </a:solidFill>
+            <a:tailEnd type="triangle"/>
+          </a:ln>
+        </p:spPr>
+        <p:style>
+          <a:lnRef idx="1">
+            <a:schemeClr val="accent1"/>
+          </a:lnRef>
+          <a:fillRef idx="0">
+            <a:schemeClr val="accent1"/>
+          </a:fillRef>
+          <a:effectRef idx="0">
+            <a:schemeClr val="accent1"/>
+          </a:effectRef>
+          <a:fontRef idx="minor">
+            <a:schemeClr val="tx1"/>
+          </a:fontRef>
+        </p:style>
+      </p:cxnSp>
+      <p:sp>
+        <p:nvSpPr>
+          <p:cNvPr id="12" name="TextBox 11">
+            <a:extLst>
+              <a:ext uri="{FF2B5EF4-FFF2-40B4-BE49-F238E27FC236}">
+                <a16:creationId xmlns:a16="http://schemas.microsoft.com/office/drawing/2014/main" id="{DE9BE5F4-180C-A565-E784-C5D5857384C8}"/>
+              </a:ext>
+            </a:extLst>
+          </p:cNvPr>
+          <p:cNvSpPr txBox="1"/>
+          <p:nvPr/>
+        </p:nvSpPr>
+        <p:spPr>
+          <a:xfrm>
+            <a:off x="577905" y="2561196"/>
+            <a:ext cx="2348720" cy="523220"/>
+          </a:xfrm>
+          <a:prstGeom prst="rect">
+            <a:avLst/>
+          </a:prstGeom>
+          <a:noFill/>
+        </p:spPr>
+        <p:txBody>
+          <a:bodyPr wrap="none" rtlCol="0">
+            <a:spAutoFit/>
+          </a:bodyPr>
+          <a:lstStyle/>
+          <a:p>
+            <a:r>
+              <a:rPr lang="en-US" sz="2800" dirty="0">
+                <a:solidFill>
+                  <a:srgbClr val="FF0000"/>
+                </a:solidFill>
+              </a:rPr>
+              <a:t>BC832 BLE SoC</a:t>
+            </a:r>
+          </a:p>
+        </p:txBody>
+      </p:sp>
+      <p:sp>
+        <p:nvSpPr>
+          <p:cNvPr id="13" name="TextBox 12">
+            <a:extLst>
+              <a:ext uri="{FF2B5EF4-FFF2-40B4-BE49-F238E27FC236}">
+                <a16:creationId xmlns:a16="http://schemas.microsoft.com/office/drawing/2014/main" id="{E86A9CDD-773A-5009-8873-258B41CDFB74}"/>
+              </a:ext>
+            </a:extLst>
+          </p:cNvPr>
+          <p:cNvSpPr txBox="1"/>
+          <p:nvPr/>
+        </p:nvSpPr>
+        <p:spPr>
+          <a:xfrm>
+            <a:off x="8349342" y="2149066"/>
+            <a:ext cx="1912704" cy="523220"/>
+          </a:xfrm>
+          <a:prstGeom prst="rect">
+            <a:avLst/>
+          </a:prstGeom>
+          <a:noFill/>
+        </p:spPr>
+        <p:txBody>
+          <a:bodyPr wrap="square" rtlCol="0">
+            <a:spAutoFit/>
+          </a:bodyPr>
+          <a:lstStyle/>
+          <a:p>
+            <a:r>
+              <a:rPr lang="en-US" sz="2800" dirty="0">
+                <a:solidFill>
+                  <a:srgbClr val="FF0000"/>
+                </a:solidFill>
+              </a:rPr>
+              <a:t>ICM20948</a:t>
+            </a:r>
+          </a:p>
+        </p:txBody>
+      </p:sp>
+      <p:cxnSp>
+        <p:nvCxnSpPr>
+          <p:cNvPr id="15" name="Straight Arrow Connector 14">
+            <a:extLst>
+              <a:ext uri="{FF2B5EF4-FFF2-40B4-BE49-F238E27FC236}">
+                <a16:creationId xmlns:a16="http://schemas.microsoft.com/office/drawing/2014/main" id="{8E67B40E-B80C-1B15-2942-4EC29810157A}"/>
+              </a:ext>
+            </a:extLst>
+          </p:cNvPr>
+          <p:cNvCxnSpPr>
+            <a:cxnSpLocks/>
+            <a:stCxn id="16" idx="1"/>
+          </p:cNvCxnSpPr>
+          <p:nvPr/>
+        </p:nvCxnSpPr>
+        <p:spPr>
+          <a:xfrm flipH="1" flipV="1">
+            <a:off x="6204859" y="5413393"/>
+            <a:ext cx="914397" cy="376715"/>
+          </a:xfrm>
+          <a:prstGeom prst="straightConnector1">
+            <a:avLst/>
+          </a:prstGeom>
+          <a:ln w="76200">
+            <a:solidFill>
+              <a:srgbClr val="FF0000"/>
+            </a:solidFill>
+            <a:tailEnd type="triangle"/>
+          </a:ln>
+        </p:spPr>
+        <p:style>
+          <a:lnRef idx="1">
+            <a:schemeClr val="accent1"/>
+          </a:lnRef>
+          <a:fillRef idx="0">
+            <a:schemeClr val="accent1"/>
+          </a:fillRef>
+          <a:effectRef idx="0">
+            <a:schemeClr val="accent1"/>
+          </a:effectRef>
+          <a:fontRef idx="minor">
+            <a:schemeClr val="tx1"/>
+          </a:fontRef>
+        </p:style>
+      </p:cxnSp>
+      <p:sp>
+        <p:nvSpPr>
+          <p:cNvPr id="16" name="TextBox 15">
+            <a:extLst>
+              <a:ext uri="{FF2B5EF4-FFF2-40B4-BE49-F238E27FC236}">
+                <a16:creationId xmlns:a16="http://schemas.microsoft.com/office/drawing/2014/main" id="{1B7F1483-98EF-D09A-A31F-9540563889AE}"/>
+              </a:ext>
+            </a:extLst>
+          </p:cNvPr>
+          <p:cNvSpPr txBox="1"/>
+          <p:nvPr/>
+        </p:nvSpPr>
+        <p:spPr>
+          <a:xfrm>
+            <a:off x="7119256" y="5528498"/>
+            <a:ext cx="3646716" cy="523220"/>
+          </a:xfrm>
+          <a:prstGeom prst="rect">
+            <a:avLst/>
+          </a:prstGeom>
+          <a:noFill/>
+        </p:spPr>
+        <p:txBody>
+          <a:bodyPr wrap="square" rtlCol="0">
+            <a:spAutoFit/>
+          </a:bodyPr>
+          <a:lstStyle/>
+          <a:p>
+            <a:r>
+              <a:rPr lang="en-US" sz="2800" dirty="0">
+                <a:solidFill>
+                  <a:srgbClr val="FF0000"/>
+                </a:solidFill>
+              </a:rPr>
+              <a:t>Joystick connector</a:t>
+            </a:r>
+          </a:p>
+        </p:txBody>
+      </p:sp>
+      <p:cxnSp>
+        <p:nvCxnSpPr>
+          <p:cNvPr id="21" name="Straight Arrow Connector 20">
+            <a:extLst>
+              <a:ext uri="{FF2B5EF4-FFF2-40B4-BE49-F238E27FC236}">
+                <a16:creationId xmlns:a16="http://schemas.microsoft.com/office/drawing/2014/main" id="{186024BA-31EA-2E15-9FA5-03DB1466DD10}"/>
+              </a:ext>
+            </a:extLst>
+          </p:cNvPr>
+          <p:cNvCxnSpPr>
+            <a:cxnSpLocks/>
+          </p:cNvCxnSpPr>
+          <p:nvPr/>
+        </p:nvCxnSpPr>
+        <p:spPr>
+          <a:xfrm flipH="1">
+            <a:off x="7707086" y="1306286"/>
+            <a:ext cx="478967" cy="718457"/>
+          </a:xfrm>
+          <a:prstGeom prst="straightConnector1">
+            <a:avLst/>
+          </a:prstGeom>
+          <a:ln w="76200">
+            <a:solidFill>
+              <a:srgbClr val="FF0000"/>
+            </a:solidFill>
+            <a:tailEnd type="triangle"/>
+          </a:ln>
+        </p:spPr>
+        <p:style>
+          <a:lnRef idx="1">
+            <a:schemeClr val="accent1"/>
+          </a:lnRef>
+          <a:fillRef idx="0">
+            <a:schemeClr val="accent1"/>
+          </a:fillRef>
+          <a:effectRef idx="0">
+            <a:schemeClr val="accent1"/>
+          </a:effectRef>
+          <a:fontRef idx="minor">
+            <a:schemeClr val="tx1"/>
+          </a:fontRef>
+        </p:style>
+      </p:cxnSp>
+      <p:sp>
+        <p:nvSpPr>
+          <p:cNvPr id="24" name="TextBox 23">
+            <a:extLst>
+              <a:ext uri="{FF2B5EF4-FFF2-40B4-BE49-F238E27FC236}">
+                <a16:creationId xmlns:a16="http://schemas.microsoft.com/office/drawing/2014/main" id="{0EBB63AA-7F08-BC66-A1FE-A147046AEFBC}"/>
+              </a:ext>
+            </a:extLst>
+          </p:cNvPr>
+          <p:cNvSpPr txBox="1"/>
+          <p:nvPr/>
+        </p:nvSpPr>
+        <p:spPr>
+          <a:xfrm>
+            <a:off x="6705600" y="682548"/>
+            <a:ext cx="4147459" cy="523220"/>
+          </a:xfrm>
+          <a:prstGeom prst="rect">
+            <a:avLst/>
+          </a:prstGeom>
+          <a:noFill/>
+        </p:spPr>
+        <p:txBody>
+          <a:bodyPr wrap="square" rtlCol="0">
+            <a:spAutoFit/>
+          </a:bodyPr>
+          <a:lstStyle/>
+          <a:p>
+            <a:r>
+              <a:rPr lang="en-US" sz="2800" dirty="0">
+                <a:solidFill>
+                  <a:srgbClr val="FF0000"/>
+                </a:solidFill>
+              </a:rPr>
+              <a:t>TTC encoder connector</a:t>
+            </a:r>
+          </a:p>
+        </p:txBody>
+      </p:sp>
+      <p:cxnSp>
+        <p:nvCxnSpPr>
+          <p:cNvPr id="25" name="Straight Arrow Connector 24">
+            <a:extLst>
+              <a:ext uri="{FF2B5EF4-FFF2-40B4-BE49-F238E27FC236}">
+                <a16:creationId xmlns:a16="http://schemas.microsoft.com/office/drawing/2014/main" id="{5996ACB8-9661-D203-6CFA-478498D09C37}"/>
+              </a:ext>
+            </a:extLst>
+          </p:cNvPr>
+          <p:cNvCxnSpPr>
+            <a:cxnSpLocks/>
+          </p:cNvCxnSpPr>
+          <p:nvPr/>
+        </p:nvCxnSpPr>
+        <p:spPr>
+          <a:xfrm>
+            <a:off x="3799114" y="1136613"/>
+            <a:ext cx="1023257" cy="844458"/>
+          </a:xfrm>
+          <a:prstGeom prst="straightConnector1">
+            <a:avLst/>
+          </a:prstGeom>
+          <a:ln w="76200">
+            <a:solidFill>
+              <a:srgbClr val="FF0000"/>
+            </a:solidFill>
+            <a:tailEnd type="triangle"/>
+          </a:ln>
+        </p:spPr>
+        <p:style>
+          <a:lnRef idx="1">
+            <a:schemeClr val="accent1"/>
+          </a:lnRef>
+          <a:fillRef idx="0">
+            <a:schemeClr val="accent1"/>
+          </a:fillRef>
+          <a:effectRef idx="0">
+            <a:schemeClr val="accent1"/>
+          </a:effectRef>
+          <a:fontRef idx="minor">
+            <a:schemeClr val="tx1"/>
+          </a:fontRef>
+        </p:style>
+      </p:cxnSp>
+      <p:sp>
+        <p:nvSpPr>
+          <p:cNvPr id="28" name="TextBox 27">
+            <a:extLst>
+              <a:ext uri="{FF2B5EF4-FFF2-40B4-BE49-F238E27FC236}">
+                <a16:creationId xmlns:a16="http://schemas.microsoft.com/office/drawing/2014/main" id="{682A5E3C-1077-E2F9-BA4E-2AE88337AA8E}"/>
+              </a:ext>
+            </a:extLst>
+          </p:cNvPr>
+          <p:cNvSpPr txBox="1"/>
+          <p:nvPr/>
+        </p:nvSpPr>
+        <p:spPr>
+          <a:xfrm>
+            <a:off x="696686" y="567444"/>
+            <a:ext cx="6117990" cy="523220"/>
+          </a:xfrm>
+          <a:prstGeom prst="rect">
+            <a:avLst/>
+          </a:prstGeom>
+          <a:noFill/>
+        </p:spPr>
+        <p:txBody>
+          <a:bodyPr wrap="square" rtlCol="0">
+            <a:spAutoFit/>
+          </a:bodyPr>
+          <a:lstStyle/>
+          <a:p>
+            <a:r>
+              <a:rPr lang="en-US" sz="2800" dirty="0">
+                <a:solidFill>
+                  <a:srgbClr val="FF0000"/>
+                </a:solidFill>
+              </a:rPr>
+              <a:t>Connector for the connector board</a:t>
+            </a:r>
+          </a:p>
+        </p:txBody>
+      </p:sp>
+    </p:spTree>
+    <p:extLst>
+      <p:ext uri="{BB962C8B-B14F-4D97-AF65-F5344CB8AC3E}">
+        <p14:creationId xmlns:p14="http://schemas.microsoft.com/office/powerpoint/2010/main" val="2407119004"/>
+      </p:ext>
+    </p:extLst>
+  </p:cSld>
+  <p:clrMapOvr>
+    <a:masterClrMapping/>
+  </p:clrMapOvr>
+</p:sld>
+</file>
+
+<file path=ppt/slides/slide3.xml><?xml version="1.0" encoding="utf-8"?>
+<p:sld xmlns:a="http://schemas.openxmlformats.org/drawingml/2006/main" xmlns:r="http://schemas.openxmlformats.org/officeDocument/2006/relationships" xmlns:p="http://schemas.openxmlformats.org/presentationml/2006/main">
+  <p:cSld>
+    <p:spTree>
+      <p:nvGrpSpPr>
+        <p:cNvPr id="1" name=""/>
+        <p:cNvGrpSpPr/>
+        <p:nvPr/>
+      </p:nvGrpSpPr>
+      <p:grpSpPr>
+        <a:xfrm>
+          <a:off x="0" y="0"/>
+          <a:ext cx="0" cy="0"/>
+          <a:chOff x="0" y="0"/>
+          <a:chExt cx="0" cy="0"/>
+        </a:xfrm>
+      </p:grpSpPr>
+      <p:pic>
+        <p:nvPicPr>
+          <p:cNvPr id="5" name="Picture 4">
+            <a:extLst>
+              <a:ext uri="{FF2B5EF4-FFF2-40B4-BE49-F238E27FC236}">
+                <a16:creationId xmlns:a16="http://schemas.microsoft.com/office/drawing/2014/main" id="{CCA97F5C-0E1B-CE5A-CAFD-9F69984FE9B4}"/>
+              </a:ext>
+            </a:extLst>
+          </p:cNvPr>
+          <p:cNvPicPr>
+            <a:picLocks noChangeAspect="1"/>
+          </p:cNvPicPr>
+          <p:nvPr/>
+        </p:nvPicPr>
+        <p:blipFill rotWithShape="1">
+          <a:blip r:embed="rId2"/>
+          <a:srcRect l="5655" t="6963" r="5548" b="3765"/>
+          <a:stretch/>
+        </p:blipFill>
+        <p:spPr>
+          <a:xfrm>
+            <a:off x="4471086" y="1198309"/>
+            <a:ext cx="3054178" cy="3015641"/>
+          </a:xfrm>
+          <a:prstGeom prst="rect">
+            <a:avLst/>
+          </a:prstGeom>
+        </p:spPr>
+      </p:pic>
+      <p:pic>
+        <p:nvPicPr>
+          <p:cNvPr id="7" name="Picture 6">
+            <a:extLst>
+              <a:ext uri="{FF2B5EF4-FFF2-40B4-BE49-F238E27FC236}">
+                <a16:creationId xmlns:a16="http://schemas.microsoft.com/office/drawing/2014/main" id="{761F6A94-6F04-1732-A358-572F76D74201}"/>
+              </a:ext>
+            </a:extLst>
+          </p:cNvPr>
+          <p:cNvPicPr>
+            <a:picLocks noChangeAspect="1"/>
+          </p:cNvPicPr>
+          <p:nvPr/>
+        </p:nvPicPr>
+        <p:blipFill>
+          <a:blip r:embed="rId3"/>
+          <a:stretch>
+            <a:fillRect/>
+          </a:stretch>
+        </p:blipFill>
+        <p:spPr>
+          <a:xfrm>
+            <a:off x="634984" y="1062680"/>
+            <a:ext cx="3836102" cy="3286898"/>
+          </a:xfrm>
+          <a:prstGeom prst="rect">
+            <a:avLst/>
+          </a:prstGeom>
+        </p:spPr>
+      </p:pic>
+      <p:pic>
+        <p:nvPicPr>
+          <p:cNvPr id="9" name="Picture 8">
+            <a:extLst>
+              <a:ext uri="{FF2B5EF4-FFF2-40B4-BE49-F238E27FC236}">
+                <a16:creationId xmlns:a16="http://schemas.microsoft.com/office/drawing/2014/main" id="{7E118F11-FDDE-5C64-CE11-31E3713B8364}"/>
+              </a:ext>
+            </a:extLst>
+          </p:cNvPr>
+          <p:cNvPicPr>
+            <a:picLocks noChangeAspect="1"/>
+          </p:cNvPicPr>
+          <p:nvPr/>
+        </p:nvPicPr>
+        <p:blipFill rotWithShape="1">
+          <a:blip r:embed="rId4"/>
+          <a:srcRect l="4637" t="2152" r="4637" b="2152"/>
+          <a:stretch/>
+        </p:blipFill>
+        <p:spPr>
+          <a:xfrm>
+            <a:off x="7525264" y="1198308"/>
+            <a:ext cx="3649570" cy="3015641"/>
+          </a:xfrm>
+          <a:prstGeom prst="rect">
+            <a:avLst/>
+          </a:prstGeom>
+        </p:spPr>
+      </p:pic>
+    </p:spTree>
+    <p:extLst>
+      <p:ext uri="{BB962C8B-B14F-4D97-AF65-F5344CB8AC3E}">
+        <p14:creationId xmlns:p14="http://schemas.microsoft.com/office/powerpoint/2010/main" val="879884299"/>
+      </p:ext>
+    </p:extLst>
+  </p:cSld>
+  <p:clrMapOvr>
+    <a:masterClrMapping/>
+  </p:clrMapOvr>
+</p:sld>
+</file>
+
+<file path=ppt/slides/slide4.xml><?xml version="1.0" encoding="utf-8"?>
+<p:sld xmlns:a="http://schemas.openxmlformats.org/drawingml/2006/main" xmlns:r="http://schemas.openxmlformats.org/officeDocument/2006/relationships" xmlns:p="http://schemas.openxmlformats.org/presentationml/2006/main">
+  <p:cSld>
+    <p:spTree>
+      <p:nvGrpSpPr>
+        <p:cNvPr id="1" name=""/>
+        <p:cNvGrpSpPr/>
+        <p:nvPr/>
+      </p:nvGrpSpPr>
+      <p:grpSpPr>
+        <a:xfrm>
+          <a:off x="0" y="0"/>
+          <a:ext cx="0" cy="0"/>
+          <a:chOff x="0" y="0"/>
+          <a:chExt cx="0" cy="0"/>
+        </a:xfrm>
+      </p:grpSpPr>
+      <p:pic>
+        <p:nvPicPr>
+          <p:cNvPr id="5" name="Picture 4">
+            <a:extLst>
+              <a:ext uri="{FF2B5EF4-FFF2-40B4-BE49-F238E27FC236}">
+                <a16:creationId xmlns:a16="http://schemas.microsoft.com/office/drawing/2014/main" id="{CCA97F5C-0E1B-CE5A-CAFD-9F69984FE9B4}"/>
+              </a:ext>
+            </a:extLst>
+          </p:cNvPr>
+          <p:cNvPicPr>
+            <a:picLocks noChangeAspect="1"/>
+          </p:cNvPicPr>
+          <p:nvPr/>
+        </p:nvPicPr>
+        <p:blipFill rotWithShape="1">
+          <a:blip r:embed="rId2"/>
+          <a:srcRect l="5655" t="6963" r="5548" b="3765"/>
+          <a:stretch/>
+        </p:blipFill>
+        <p:spPr>
+          <a:xfrm>
+            <a:off x="4471086" y="1198309"/>
+            <a:ext cx="3054178" cy="3015641"/>
+          </a:xfrm>
+          <a:prstGeom prst="rect">
+            <a:avLst/>
+          </a:prstGeom>
+        </p:spPr>
+      </p:pic>
+      <p:pic>
+        <p:nvPicPr>
+          <p:cNvPr id="7" name="Picture 6">
+            <a:extLst>
+              <a:ext uri="{FF2B5EF4-FFF2-40B4-BE49-F238E27FC236}">
+                <a16:creationId xmlns:a16="http://schemas.microsoft.com/office/drawing/2014/main" id="{761F6A94-6F04-1732-A358-572F76D74201}"/>
+              </a:ext>
+            </a:extLst>
+          </p:cNvPr>
+          <p:cNvPicPr>
+            <a:picLocks noChangeAspect="1"/>
+          </p:cNvPicPr>
+          <p:nvPr/>
+        </p:nvPicPr>
+        <p:blipFill>
+          <a:blip r:embed="rId3"/>
+          <a:stretch>
+            <a:fillRect/>
+          </a:stretch>
+        </p:blipFill>
+        <p:spPr>
+          <a:xfrm>
+            <a:off x="634984" y="1062680"/>
+            <a:ext cx="3836102" cy="3286898"/>
+          </a:xfrm>
+          <a:prstGeom prst="rect">
+            <a:avLst/>
+          </a:prstGeom>
+        </p:spPr>
+      </p:pic>
+      <p:pic>
+        <p:nvPicPr>
+          <p:cNvPr id="9" name="Picture 8">
+            <a:extLst>
+              <a:ext uri="{FF2B5EF4-FFF2-40B4-BE49-F238E27FC236}">
+                <a16:creationId xmlns:a16="http://schemas.microsoft.com/office/drawing/2014/main" id="{7E118F11-FDDE-5C64-CE11-31E3713B8364}"/>
+              </a:ext>
+            </a:extLst>
+          </p:cNvPr>
+          <p:cNvPicPr>
+            <a:picLocks noChangeAspect="1"/>
+          </p:cNvPicPr>
+          <p:nvPr/>
+        </p:nvPicPr>
+        <p:blipFill rotWithShape="1">
+          <a:blip r:embed="rId4"/>
+          <a:srcRect l="4637" t="2152" r="4637" b="2152"/>
+          <a:stretch/>
+        </p:blipFill>
+        <p:spPr>
+          <a:xfrm>
+            <a:off x="7525264" y="1198308"/>
+            <a:ext cx="3649570" cy="3015641"/>
+          </a:xfrm>
+          <a:prstGeom prst="rect">
+            <a:avLst/>
+          </a:prstGeom>
+        </p:spPr>
+      </p:pic>
+    </p:spTree>
+    <p:extLst>
+      <p:ext uri="{BB962C8B-B14F-4D97-AF65-F5344CB8AC3E}">
+        <p14:creationId xmlns:p14="http://schemas.microsoft.com/office/powerpoint/2010/main" val="1586844881"/>
       </p:ext>
     </p:extLst>
   </p:cSld>

</xml_diff>